<commit_message>
Add Slides into ppt.pptx file
</commit_message>
<xml_diff>
--- a/ppt.pptx
+++ b/ppt.pptx
@@ -4,6 +4,9 @@
   <p:sldMasterIdLst>
     <p:sldMasterId id="2147483648" r:id="rId1"/>
   </p:sldMasterIdLst>
+  <p:sldIdLst>
+    <p:sldId id="256" r:id="rId2"/>
+  </p:sldIdLst>
   <p:sldSz cx="9144000" cy="6858000" type="screen4x3"/>
   <p:notesSz cx="6858000" cy="9144000"/>
   <p:defaultTextStyle>
@@ -286,7 +289,7 @@
             <a:fld id="{1D8BD707-D9CF-40AE-B4C6-C98DA3205C09}" type="datetimeFigureOut">
               <a:rPr lang="en-US" smtClean="0"/>
               <a:pPr/>
-              <a:t>9/18/2006</a:t>
+              <a:t>3/3/2020</a:t>
             </a:fld>
             <a:endParaRPr lang="en-US"/>
           </a:p>
@@ -453,7 +456,7 @@
             <a:fld id="{1D8BD707-D9CF-40AE-B4C6-C98DA3205C09}" type="datetimeFigureOut">
               <a:rPr lang="en-US" smtClean="0"/>
               <a:pPr/>
-              <a:t>9/18/2006</a:t>
+              <a:t>3/3/2020</a:t>
             </a:fld>
             <a:endParaRPr lang="en-US"/>
           </a:p>
@@ -630,7 +633,7 @@
             <a:fld id="{1D8BD707-D9CF-40AE-B4C6-C98DA3205C09}" type="datetimeFigureOut">
               <a:rPr lang="en-US" smtClean="0"/>
               <a:pPr/>
-              <a:t>9/18/2006</a:t>
+              <a:t>3/3/2020</a:t>
             </a:fld>
             <a:endParaRPr lang="en-US"/>
           </a:p>
@@ -797,7 +800,7 @@
             <a:fld id="{1D8BD707-D9CF-40AE-B4C6-C98DA3205C09}" type="datetimeFigureOut">
               <a:rPr lang="en-US" smtClean="0"/>
               <a:pPr/>
-              <a:t>9/18/2006</a:t>
+              <a:t>3/3/2020</a:t>
             </a:fld>
             <a:endParaRPr lang="en-US"/>
           </a:p>
@@ -1040,7 +1043,7 @@
             <a:fld id="{1D8BD707-D9CF-40AE-B4C6-C98DA3205C09}" type="datetimeFigureOut">
               <a:rPr lang="en-US" smtClean="0"/>
               <a:pPr/>
-              <a:t>9/18/2006</a:t>
+              <a:t>3/3/2020</a:t>
             </a:fld>
             <a:endParaRPr lang="en-US"/>
           </a:p>
@@ -1325,7 +1328,7 @@
             <a:fld id="{1D8BD707-D9CF-40AE-B4C6-C98DA3205C09}" type="datetimeFigureOut">
               <a:rPr lang="en-US" smtClean="0"/>
               <a:pPr/>
-              <a:t>9/18/2006</a:t>
+              <a:t>3/3/2020</a:t>
             </a:fld>
             <a:endParaRPr lang="en-US"/>
           </a:p>
@@ -1744,7 +1747,7 @@
             <a:fld id="{1D8BD707-D9CF-40AE-B4C6-C98DA3205C09}" type="datetimeFigureOut">
               <a:rPr lang="en-US" smtClean="0"/>
               <a:pPr/>
-              <a:t>9/18/2006</a:t>
+              <a:t>3/3/2020</a:t>
             </a:fld>
             <a:endParaRPr lang="en-US"/>
           </a:p>
@@ -1859,7 +1862,7 @@
             <a:fld id="{1D8BD707-D9CF-40AE-B4C6-C98DA3205C09}" type="datetimeFigureOut">
               <a:rPr lang="en-US" smtClean="0"/>
               <a:pPr/>
-              <a:t>9/18/2006</a:t>
+              <a:t>3/3/2020</a:t>
             </a:fld>
             <a:endParaRPr lang="en-US"/>
           </a:p>
@@ -1951,7 +1954,7 @@
             <a:fld id="{1D8BD707-D9CF-40AE-B4C6-C98DA3205C09}" type="datetimeFigureOut">
               <a:rPr lang="en-US" smtClean="0"/>
               <a:pPr/>
-              <a:t>9/18/2006</a:t>
+              <a:t>3/3/2020</a:t>
             </a:fld>
             <a:endParaRPr lang="en-US"/>
           </a:p>
@@ -2225,7 +2228,7 @@
             <a:fld id="{1D8BD707-D9CF-40AE-B4C6-C98DA3205C09}" type="datetimeFigureOut">
               <a:rPr lang="en-US" smtClean="0"/>
               <a:pPr/>
-              <a:t>9/18/2006</a:t>
+              <a:t>3/3/2020</a:t>
             </a:fld>
             <a:endParaRPr lang="en-US"/>
           </a:p>
@@ -2475,7 +2478,7 @@
             <a:fld id="{1D8BD707-D9CF-40AE-B4C6-C98DA3205C09}" type="datetimeFigureOut">
               <a:rPr lang="en-US" smtClean="0"/>
               <a:pPr/>
-              <a:t>9/18/2006</a:t>
+              <a:t>3/3/2020</a:t>
             </a:fld>
             <a:endParaRPr lang="en-US"/>
           </a:p>
@@ -2685,7 +2688,7 @@
             <a:fld id="{1D8BD707-D9CF-40AE-B4C6-C98DA3205C09}" type="datetimeFigureOut">
               <a:rPr lang="en-US" smtClean="0"/>
               <a:pPr/>
-              <a:t>9/18/2006</a:t>
+              <a:t>3/3/2020</a:t>
             </a:fld>
             <a:endParaRPr lang="en-US"/>
           </a:p>
@@ -3037,6 +3040,81 @@
     </p:otherStyle>
   </p:txStyles>
 </p:sldMaster>
+</file>
+
+<file path=ppt/slides/slide1.xml><?xml version="1.0" encoding="utf-8"?>
+<p:sld xmlns:a="http://schemas.openxmlformats.org/drawingml/2006/main" xmlns:r="http://schemas.openxmlformats.org/officeDocument/2006/relationships" xmlns:p="http://schemas.openxmlformats.org/presentationml/2006/main">
+  <p:cSld>
+    <p:spTree>
+      <p:nvGrpSpPr>
+        <p:cNvPr id="1" name=""/>
+        <p:cNvGrpSpPr/>
+        <p:nvPr/>
+      </p:nvGrpSpPr>
+      <p:grpSpPr>
+        <a:xfrm>
+          <a:off x="0" y="0"/>
+          <a:ext cx="0" cy="0"/>
+          <a:chOff x="0" y="0"/>
+          <a:chExt cx="0" cy="0"/>
+        </a:xfrm>
+      </p:grpSpPr>
+      <p:sp>
+        <p:nvSpPr>
+          <p:cNvPr id="2" name="Title 1"/>
+          <p:cNvSpPr>
+            <a:spLocks noGrp="1"/>
+          </p:cNvSpPr>
+          <p:nvPr>
+            <p:ph type="ctrTitle"/>
+          </p:nvPr>
+        </p:nvSpPr>
+        <p:spPr/>
+        <p:txBody>
+          <a:bodyPr/>
+          <a:lstStyle/>
+          <a:p>
+            <a:r>
+              <a:rPr lang="en-US" dirty="0" err="1" smtClean="0"/>
+              <a:t>jhkhgkjybiuyikbyi</a:t>
+            </a:r>
+            <a:endParaRPr lang="en-US" dirty="0"/>
+          </a:p>
+        </p:txBody>
+      </p:sp>
+      <p:sp>
+        <p:nvSpPr>
+          <p:cNvPr id="3" name="Subtitle 2"/>
+          <p:cNvSpPr>
+            <a:spLocks noGrp="1"/>
+          </p:cNvSpPr>
+          <p:nvPr>
+            <p:ph type="subTitle" idx="1"/>
+          </p:nvPr>
+        </p:nvSpPr>
+        <p:spPr/>
+        <p:txBody>
+          <a:bodyPr/>
+          <a:lstStyle/>
+          <a:p>
+            <a:r>
+              <a:rPr lang="en-US" dirty="0" err="1" smtClean="0"/>
+              <a:t>Mbkjhkbhjubinkuybiy</a:t>
+            </a:r>
+            <a:r>
+              <a:rPr lang="en-US" smtClean="0"/>
+              <a:t> 8</a:t>
+            </a:r>
+            <a:endParaRPr lang="en-US"/>
+          </a:p>
+        </p:txBody>
+      </p:sp>
+    </p:spTree>
+  </p:cSld>
+  <p:clrMapOvr>
+    <a:masterClrMapping/>
+  </p:clrMapOvr>
+</p:sld>
 </file>
 
 <file path=ppt/theme/theme1.xml><?xml version="1.0" encoding="utf-8"?>

</xml_diff>